<commit_message>
Added project description in PPT
</commit_message>
<xml_diff>
--- a/B-Team_Flamingo_Infosys.pptx
+++ b/B-Team_Flamingo_Infosys.pptx
@@ -3481,7 +3481,7 @@
           <a:p>
             <a:fld id="{C920D7D8-28A5-4140-953B-AF1B2C74651B}" type="datetimeFigureOut">
               <a:rPr lang="en-US" smtClean="0"/>
-              <a:t>10/3/2020</a:t>
+              <a:t>10/5/2020</a:t>
             </a:fld>
             <a:endParaRPr lang="en-US"/>
           </a:p>
@@ -3557,7 +3557,7 @@
           </a:ln>
           <a:extLst>
             <a:ext uri="{91240B29-F687-4f45-9708-019B960494DF}">
-              <a14:hiddenLine xmlns="" xmlns:a14="http://schemas.microsoft.com/office/drawing/2010/main" w="9525">
+              <a14:hiddenLine xmlns:a14="http://schemas.microsoft.com/office/drawing/2010/main" xmlns="" w="9525">
                 <a:solidFill>
                   <a:srgbClr val="000000"/>
                 </a:solidFill>
@@ -3612,7 +3612,7 @@
           </a:ln>
           <a:extLst>
             <a:ext uri="{91240B29-F687-4f45-9708-019B960494DF}">
-              <a14:hiddenLine xmlns="" xmlns:a14="http://schemas.microsoft.com/office/drawing/2010/main" w="9525">
+              <a14:hiddenLine xmlns:a14="http://schemas.microsoft.com/office/drawing/2010/main" xmlns="" w="9525">
                 <a:solidFill>
                   <a:srgbClr val="000000"/>
                 </a:solidFill>
@@ -3975,7 +3975,7 @@
           <a:p>
             <a:fld id="{C920D7D8-28A5-4140-953B-AF1B2C74651B}" type="datetimeFigureOut">
               <a:rPr lang="en-US" smtClean="0"/>
-              <a:t>10/3/2020</a:t>
+              <a:t>10/5/2020</a:t>
             </a:fld>
             <a:endParaRPr lang="en-US"/>
           </a:p>
@@ -4231,7 +4231,7 @@
           <a:p>
             <a:fld id="{C920D7D8-28A5-4140-953B-AF1B2C74651B}" type="datetimeFigureOut">
               <a:rPr lang="en-US" smtClean="0"/>
-              <a:t>10/3/2020</a:t>
+              <a:t>10/5/2020</a:t>
             </a:fld>
             <a:endParaRPr lang="en-US"/>
           </a:p>
@@ -4779,7 +4779,7 @@
           <a:p>
             <a:fld id="{C920D7D8-28A5-4140-953B-AF1B2C74651B}" type="datetimeFigureOut">
               <a:rPr lang="en-US" smtClean="0"/>
-              <a:t>10/3/2020</a:t>
+              <a:t>10/5/2020</a:t>
             </a:fld>
             <a:endParaRPr lang="en-US"/>
           </a:p>
@@ -5035,7 +5035,7 @@
           <a:p>
             <a:fld id="{C920D7D8-28A5-4140-953B-AF1B2C74651B}" type="datetimeFigureOut">
               <a:rPr lang="en-US" smtClean="0"/>
-              <a:t>10/3/2020</a:t>
+              <a:t>10/5/2020</a:t>
             </a:fld>
             <a:endParaRPr lang="en-US"/>
           </a:p>
@@ -5575,7 +5575,7 @@
           <a:p>
             <a:fld id="{C920D7D8-28A5-4140-953B-AF1B2C74651B}" type="datetimeFigureOut">
               <a:rPr lang="en-US" smtClean="0"/>
-              <a:t>10/3/2020</a:t>
+              <a:t>10/5/2020</a:t>
             </a:fld>
             <a:endParaRPr lang="en-US"/>
           </a:p>
@@ -5880,7 +5880,7 @@
           <a:p>
             <a:fld id="{C920D7D8-28A5-4140-953B-AF1B2C74651B}" type="datetimeFigureOut">
               <a:rPr lang="en-US" smtClean="0"/>
-              <a:t>10/3/2020</a:t>
+              <a:t>10/5/2020</a:t>
             </a:fld>
             <a:endParaRPr lang="en-US"/>
           </a:p>
@@ -6062,7 +6062,7 @@
           <a:p>
             <a:fld id="{C920D7D8-28A5-4140-953B-AF1B2C74651B}" type="datetimeFigureOut">
               <a:rPr lang="en-US" smtClean="0"/>
-              <a:t>10/3/2020</a:t>
+              <a:t>10/5/2020</a:t>
             </a:fld>
             <a:endParaRPr lang="en-US"/>
           </a:p>
@@ -6250,7 +6250,7 @@
           <a:p>
             <a:fld id="{C920D7D8-28A5-4140-953B-AF1B2C74651B}" type="datetimeFigureOut">
               <a:rPr lang="en-US" smtClean="0"/>
-              <a:t>10/3/2020</a:t>
+              <a:t>10/5/2020</a:t>
             </a:fld>
             <a:endParaRPr lang="en-US"/>
           </a:p>
@@ -6442,7 +6442,7 @@
           <a:p>
             <a:fld id="{C920D7D8-28A5-4140-953B-AF1B2C74651B}" type="datetimeFigureOut">
               <a:rPr lang="en-US" smtClean="0"/>
-              <a:t>10/3/2020</a:t>
+              <a:t>10/5/2020</a:t>
             </a:fld>
             <a:endParaRPr lang="en-US"/>
           </a:p>
@@ -6701,7 +6701,7 @@
           <a:p>
             <a:fld id="{C920D7D8-28A5-4140-953B-AF1B2C74651B}" type="datetimeFigureOut">
               <a:rPr lang="en-US" smtClean="0"/>
-              <a:t>10/3/2020</a:t>
+              <a:t>10/5/2020</a:t>
             </a:fld>
             <a:endParaRPr lang="en-US"/>
           </a:p>
@@ -7006,7 +7006,7 @@
           <a:p>
             <a:fld id="{C920D7D8-28A5-4140-953B-AF1B2C74651B}" type="datetimeFigureOut">
               <a:rPr lang="en-US" smtClean="0"/>
-              <a:t>10/3/2020</a:t>
+              <a:t>10/5/2020</a:t>
             </a:fld>
             <a:endParaRPr lang="en-US"/>
           </a:p>
@@ -7456,7 +7456,7 @@
           <a:p>
             <a:fld id="{C920D7D8-28A5-4140-953B-AF1B2C74651B}" type="datetimeFigureOut">
               <a:rPr lang="en-US" smtClean="0"/>
-              <a:t>10/3/2020</a:t>
+              <a:t>10/5/2020</a:t>
             </a:fld>
             <a:endParaRPr lang="en-US"/>
           </a:p>
@@ -7582,7 +7582,7 @@
           <a:p>
             <a:fld id="{C920D7D8-28A5-4140-953B-AF1B2C74651B}" type="datetimeFigureOut">
               <a:rPr lang="en-US" smtClean="0"/>
-              <a:t>10/3/2020</a:t>
+              <a:t>10/5/2020</a:t>
             </a:fld>
             <a:endParaRPr lang="en-US"/>
           </a:p>
@@ -7685,7 +7685,7 @@
           <a:p>
             <a:fld id="{C920D7D8-28A5-4140-953B-AF1B2C74651B}" type="datetimeFigureOut">
               <a:rPr lang="en-US" smtClean="0"/>
-              <a:t>10/3/2020</a:t>
+              <a:t>10/5/2020</a:t>
             </a:fld>
             <a:endParaRPr lang="en-US"/>
           </a:p>
@@ -7976,7 +7976,7 @@
           <a:p>
             <a:fld id="{C920D7D8-28A5-4140-953B-AF1B2C74651B}" type="datetimeFigureOut">
               <a:rPr lang="en-US" smtClean="0"/>
-              <a:t>10/3/2020</a:t>
+              <a:t>10/5/2020</a:t>
             </a:fld>
             <a:endParaRPr lang="en-US"/>
           </a:p>
@@ -8275,7 +8275,7 @@
           <a:p>
             <a:fld id="{C920D7D8-28A5-4140-953B-AF1B2C74651B}" type="datetimeFigureOut">
               <a:rPr lang="en-US" smtClean="0"/>
-              <a:t>10/3/2020</a:t>
+              <a:t>10/5/2020</a:t>
             </a:fld>
             <a:endParaRPr lang="en-US"/>
           </a:p>
@@ -8504,7 +8504,7 @@
           <a:p>
             <a:fld id="{C920D7D8-28A5-4140-953B-AF1B2C74651B}" type="datetimeFigureOut">
               <a:rPr lang="en-US" smtClean="0"/>
-              <a:t>10/3/2020</a:t>
+              <a:t>10/5/2020</a:t>
             </a:fld>
             <a:endParaRPr lang="en-US"/>
           </a:p>
@@ -11179,6 +11179,90 @@
           </a:p>
         </p:txBody>
       </p:sp>
+      <p:sp>
+        <p:nvSpPr>
+          <p:cNvPr id="2" name="Title 1">
+            <a:extLst>
+              <a:ext uri="{FF2B5EF4-FFF2-40B4-BE49-F238E27FC236}">
+                <a16:creationId xmlns:a16="http://schemas.microsoft.com/office/drawing/2014/main" id="{B3B91B19-B1C8-4698-A86A-EED7C3E44FB5}"/>
+              </a:ext>
+            </a:extLst>
+          </p:cNvPr>
+          <p:cNvSpPr>
+            <a:spLocks noGrp="1"/>
+          </p:cNvSpPr>
+          <p:nvPr>
+            <p:ph type="title"/>
+          </p:nvPr>
+        </p:nvSpPr>
+        <p:spPr/>
+        <p:txBody>
+          <a:bodyPr/>
+          <a:lstStyle/>
+          <a:p>
+            <a:r>
+              <a:rPr lang="en-US" dirty="0"/>
+              <a:t>Project Description</a:t>
+            </a:r>
+          </a:p>
+        </p:txBody>
+      </p:sp>
+      <p:sp>
+        <p:nvSpPr>
+          <p:cNvPr id="3" name="Content Placeholder 2">
+            <a:extLst>
+              <a:ext uri="{FF2B5EF4-FFF2-40B4-BE49-F238E27FC236}">
+                <a16:creationId xmlns:a16="http://schemas.microsoft.com/office/drawing/2014/main" id="{2BAD9E88-C83C-4808-950C-88FFDE5FD4D7}"/>
+              </a:ext>
+            </a:extLst>
+          </p:cNvPr>
+          <p:cNvSpPr>
+            <a:spLocks noGrp="1"/>
+          </p:cNvSpPr>
+          <p:nvPr>
+            <p:ph idx="1"/>
+          </p:nvPr>
+        </p:nvSpPr>
+        <p:spPr/>
+        <p:txBody>
+          <a:bodyPr>
+            <a:normAutofit fontScale="92500" lnSpcReduction="20000"/>
+          </a:bodyPr>
+          <a:lstStyle/>
+          <a:p>
+            <a:r>
+              <a:rPr lang="en-US" dirty="0"/>
+              <a:t>Project Flamingo takes care of the needs and concerns of warriors, who fight against the daemon in them and the doctors, who do the noble cause in supporting the warriors both physically and mentally.</a:t>
+            </a:r>
+          </a:p>
+          <a:p>
+            <a:r>
+              <a:rPr lang="en-US" dirty="0"/>
+              <a:t>In this project, the privacy of the warriors is considered in all aspects of the application.</a:t>
+            </a:r>
+          </a:p>
+          <a:p>
+            <a:r>
+              <a:rPr lang="en-US" dirty="0"/>
+              <a:t>Angels in disguise can also use this application to grant the wishes of warriors thus bringing a hope and light to their life.</a:t>
+            </a:r>
+          </a:p>
+          <a:p>
+            <a:r>
+              <a:rPr lang="en-US" dirty="0"/>
+              <a:t>This project also brings in the latest and efficient technologies in market to achieve this </a:t>
+            </a:r>
+            <a:r>
+              <a:rPr lang="en-US"/>
+              <a:t>noble cause.</a:t>
+            </a:r>
+            <a:endParaRPr lang="en-US" dirty="0"/>
+          </a:p>
+          <a:p>
+            <a:endParaRPr lang="en-US" dirty="0"/>
+          </a:p>
+        </p:txBody>
+      </p:sp>
     </p:spTree>
     <p:extLst>
       <p:ext uri="{BB962C8B-B14F-4D97-AF65-F5344CB8AC3E}">

</xml_diff>